<commit_message>
slides for session 5
</commit_message>
<xml_diff>
--- a/python1/Python_I/Python I.pptx
+++ b/python1/Python_I/Python I.pptx
@@ -5,10 +5,10 @@
     <p:sldMasterId id="2147483648" r:id="rId1"/>
   </p:sldMasterIdLst>
   <p:notesMasterIdLst>
-    <p:notesMasterId r:id="rId57"/>
+    <p:notesMasterId r:id="rId66"/>
   </p:notesMasterIdLst>
   <p:handoutMasterIdLst>
-    <p:handoutMasterId r:id="rId58"/>
+    <p:handoutMasterId r:id="rId67"/>
   </p:handoutMasterIdLst>
   <p:sldIdLst>
     <p:sldId id="256" r:id="rId2"/>
@@ -66,6 +66,15 @@
     <p:sldId id="311" r:id="rId54"/>
     <p:sldId id="313" r:id="rId55"/>
     <p:sldId id="312" r:id="rId56"/>
+    <p:sldId id="314" r:id="rId57"/>
+    <p:sldId id="321" r:id="rId58"/>
+    <p:sldId id="315" r:id="rId59"/>
+    <p:sldId id="322" r:id="rId60"/>
+    <p:sldId id="316" r:id="rId61"/>
+    <p:sldId id="317" r:id="rId62"/>
+    <p:sldId id="318" r:id="rId63"/>
+    <p:sldId id="319" r:id="rId64"/>
+    <p:sldId id="320" r:id="rId65"/>
   </p:sldIdLst>
   <p:sldSz cx="9144000" cy="6858000" type="screen4x3"/>
   <p:notesSz cx="6858000" cy="9144000"/>
@@ -224,6 +233,15 @@
             <p14:sldId id="311"/>
             <p14:sldId id="313"/>
             <p14:sldId id="312"/>
+            <p14:sldId id="314"/>
+            <p14:sldId id="321"/>
+            <p14:sldId id="315"/>
+            <p14:sldId id="322"/>
+            <p14:sldId id="316"/>
+            <p14:sldId id="317"/>
+            <p14:sldId id="318"/>
+            <p14:sldId id="319"/>
+            <p14:sldId id="320"/>
           </p14:sldIdLst>
         </p14:section>
       </p14:sectionLst>
@@ -314,7 +332,7 @@
           <a:p>
             <a:fld id="{0E55979A-6572-C345-8A17-1B9669C1AB5F}" type="datetimeFigureOut">
               <a:rPr lang="en-US" smtClean="0"/>
-              <a:t>12/11/14</a:t>
+              <a:t>12/16/14</a:t>
             </a:fld>
             <a:endParaRPr lang="en-US"/>
           </a:p>
@@ -479,7 +497,7 @@
           <a:p>
             <a:fld id="{653C71E1-2290-564F-BD34-083E275CDC9C}" type="datetimeFigureOut">
               <a:rPr lang="en-US" smtClean="0"/>
-              <a:t>12/11/14</a:t>
+              <a:t>12/16/14</a:t>
             </a:fld>
             <a:endParaRPr lang="en-US"/>
           </a:p>
@@ -1020,7 +1038,7 @@
           <a:p>
             <a:fld id="{C5F768C4-3DAA-DD4B-BF5F-275792F6483D}" type="datetimeFigureOut">
               <a:rPr lang="en-US" smtClean="0"/>
-              <a:t>12/11/14</a:t>
+              <a:t>12/16/14</a:t>
             </a:fld>
             <a:endParaRPr lang="en-US"/>
           </a:p>
@@ -1190,7 +1208,7 @@
           <a:p>
             <a:fld id="{C5F768C4-3DAA-DD4B-BF5F-275792F6483D}" type="datetimeFigureOut">
               <a:rPr lang="en-US" smtClean="0"/>
-              <a:t>12/11/14</a:t>
+              <a:t>12/16/14</a:t>
             </a:fld>
             <a:endParaRPr lang="en-US"/>
           </a:p>
@@ -1370,7 +1388,7 @@
           <a:p>
             <a:fld id="{C5F768C4-3DAA-DD4B-BF5F-275792F6483D}" type="datetimeFigureOut">
               <a:rPr lang="en-US" smtClean="0"/>
-              <a:t>12/11/14</a:t>
+              <a:t>12/16/14</a:t>
             </a:fld>
             <a:endParaRPr lang="en-US"/>
           </a:p>
@@ -1540,7 +1558,7 @@
           <a:p>
             <a:fld id="{C5F768C4-3DAA-DD4B-BF5F-275792F6483D}" type="datetimeFigureOut">
               <a:rPr lang="en-US" smtClean="0"/>
-              <a:t>12/11/14</a:t>
+              <a:t>12/16/14</a:t>
             </a:fld>
             <a:endParaRPr lang="en-US"/>
           </a:p>
@@ -1786,7 +1804,7 @@
           <a:p>
             <a:fld id="{C5F768C4-3DAA-DD4B-BF5F-275792F6483D}" type="datetimeFigureOut">
               <a:rPr lang="en-US" smtClean="0"/>
-              <a:t>12/11/14</a:t>
+              <a:t>12/16/14</a:t>
             </a:fld>
             <a:endParaRPr lang="en-US"/>
           </a:p>
@@ -2074,7 +2092,7 @@
           <a:p>
             <a:fld id="{C5F768C4-3DAA-DD4B-BF5F-275792F6483D}" type="datetimeFigureOut">
               <a:rPr lang="en-US" smtClean="0"/>
-              <a:t>12/11/14</a:t>
+              <a:t>12/16/14</a:t>
             </a:fld>
             <a:endParaRPr lang="en-US"/>
           </a:p>
@@ -2496,7 +2514,7 @@
           <a:p>
             <a:fld id="{C5F768C4-3DAA-DD4B-BF5F-275792F6483D}" type="datetimeFigureOut">
               <a:rPr lang="en-US" smtClean="0"/>
-              <a:t>12/11/14</a:t>
+              <a:t>12/16/14</a:t>
             </a:fld>
             <a:endParaRPr lang="en-US"/>
           </a:p>
@@ -2614,7 +2632,7 @@
           <a:p>
             <a:fld id="{C5F768C4-3DAA-DD4B-BF5F-275792F6483D}" type="datetimeFigureOut">
               <a:rPr lang="en-US" smtClean="0"/>
-              <a:t>12/11/14</a:t>
+              <a:t>12/16/14</a:t>
             </a:fld>
             <a:endParaRPr lang="en-US"/>
           </a:p>
@@ -2709,7 +2727,7 @@
           <a:p>
             <a:fld id="{C5F768C4-3DAA-DD4B-BF5F-275792F6483D}" type="datetimeFigureOut">
               <a:rPr lang="en-US" smtClean="0"/>
-              <a:t>12/11/14</a:t>
+              <a:t>12/16/14</a:t>
             </a:fld>
             <a:endParaRPr lang="en-US"/>
           </a:p>
@@ -2986,7 +3004,7 @@
           <a:p>
             <a:fld id="{C5F768C4-3DAA-DD4B-BF5F-275792F6483D}" type="datetimeFigureOut">
               <a:rPr lang="en-US" smtClean="0"/>
-              <a:t>12/11/14</a:t>
+              <a:t>12/16/14</a:t>
             </a:fld>
             <a:endParaRPr lang="en-US"/>
           </a:p>
@@ -3239,7 +3257,7 @@
           <a:p>
             <a:fld id="{C5F768C4-3DAA-DD4B-BF5F-275792F6483D}" type="datetimeFigureOut">
               <a:rPr lang="en-US" smtClean="0"/>
-              <a:t>12/11/14</a:t>
+              <a:t>12/16/14</a:t>
             </a:fld>
             <a:endParaRPr lang="en-US"/>
           </a:p>
@@ -3452,7 +3470,7 @@
           <a:p>
             <a:fld id="{C5F768C4-3DAA-DD4B-BF5F-275792F6483D}" type="datetimeFigureOut">
               <a:rPr lang="en-US" smtClean="0"/>
-              <a:t>12/11/14</a:t>
+              <a:t>12/16/14</a:t>
             </a:fld>
             <a:endParaRPr lang="en-US"/>
           </a:p>
@@ -5747,6 +5765,13 @@
   <p:clrMapOvr>
     <a:masterClrMapping/>
   </p:clrMapOvr>
+  <p:timing>
+    <p:tnLst>
+      <p:par>
+        <p:cTn xmlns:p14="http://schemas.microsoft.com/office/powerpoint/2010/main" id="1" dur="indefinite" restart="never" nodeType="tmRoot"/>
+      </p:par>
+    </p:tnLst>
+  </p:timing>
 </p:sld>
 </file>
 
@@ -11787,6 +11812,13 @@
   <p:clrMapOvr>
     <a:masterClrMapping/>
   </p:clrMapOvr>
+  <p:timing>
+    <p:tnLst>
+      <p:par>
+        <p:cTn xmlns:p14="http://schemas.microsoft.com/office/powerpoint/2010/main" id="1" dur="indefinite" restart="never" nodeType="tmRoot"/>
+      </p:par>
+    </p:tnLst>
+  </p:timing>
 </p:sld>
 </file>
 
@@ -11918,6 +11950,540 @@
   <p:clrMapOvr>
     <a:masterClrMapping/>
   </p:clrMapOvr>
+  <p:timing>
+    <p:tnLst>
+      <p:par>
+        <p:cTn xmlns:p14="http://schemas.microsoft.com/office/powerpoint/2010/main" id="1" dur="indefinite" restart="never" nodeType="tmRoot"/>
+      </p:par>
+    </p:tnLst>
+  </p:timing>
+</p:sld>
+</file>
+
+<file path=ppt/slides/slide56.xml><?xml version="1.0" encoding="utf-8"?>
+<p:sld xmlns:a="http://schemas.openxmlformats.org/drawingml/2006/main" xmlns:r="http://schemas.openxmlformats.org/officeDocument/2006/relationships" xmlns:p="http://schemas.openxmlformats.org/presentationml/2006/main">
+  <p:cSld>
+    <p:spTree>
+      <p:nvGrpSpPr>
+        <p:cNvPr id="1" name=""/>
+        <p:cNvGrpSpPr/>
+        <p:nvPr/>
+      </p:nvGrpSpPr>
+      <p:grpSpPr>
+        <a:xfrm>
+          <a:off x="0" y="0"/>
+          <a:ext cx="0" cy="0"/>
+          <a:chOff x="0" y="0"/>
+          <a:chExt cx="0" cy="0"/>
+        </a:xfrm>
+      </p:grpSpPr>
+      <p:sp>
+        <p:nvSpPr>
+          <p:cNvPr id="2" name="Title 1"/>
+          <p:cNvSpPr>
+            <a:spLocks noGrp="1"/>
+          </p:cNvSpPr>
+          <p:nvPr>
+            <p:ph type="title"/>
+          </p:nvPr>
+        </p:nvSpPr>
+        <p:spPr/>
+        <p:txBody>
+          <a:bodyPr/>
+          <a:lstStyle/>
+          <a:p>
+            <a:r>
+              <a:rPr lang="en-US" dirty="0" smtClean="0"/>
+              <a:t>Day 5</a:t>
+            </a:r>
+            <a:endParaRPr lang="en-US" dirty="0"/>
+          </a:p>
+        </p:txBody>
+      </p:sp>
+    </p:spTree>
+    <p:extLst>
+      <p:ext uri="{BB962C8B-B14F-4D97-AF65-F5344CB8AC3E}">
+        <p14:creationId xmlns:p14="http://schemas.microsoft.com/office/powerpoint/2010/main" val="997843061"/>
+      </p:ext>
+    </p:extLst>
+  </p:cSld>
+  <p:clrMapOvr>
+    <a:masterClrMapping/>
+  </p:clrMapOvr>
+  <p:timing>
+    <p:tnLst>
+      <p:par>
+        <p:cTn xmlns:p14="http://schemas.microsoft.com/office/powerpoint/2010/main" id="1" dur="indefinite" restart="never" nodeType="tmRoot"/>
+      </p:par>
+    </p:tnLst>
+  </p:timing>
+</p:sld>
+</file>
+
+<file path=ppt/slides/slide57.xml><?xml version="1.0" encoding="utf-8"?>
+<p:sld xmlns:a="http://schemas.openxmlformats.org/drawingml/2006/main" xmlns:r="http://schemas.openxmlformats.org/officeDocument/2006/relationships" xmlns:p="http://schemas.openxmlformats.org/presentationml/2006/main">
+  <p:cSld>
+    <p:spTree>
+      <p:nvGrpSpPr>
+        <p:cNvPr id="1" name=""/>
+        <p:cNvGrpSpPr/>
+        <p:nvPr/>
+      </p:nvGrpSpPr>
+      <p:grpSpPr>
+        <a:xfrm>
+          <a:off x="0" y="0"/>
+          <a:ext cx="0" cy="0"/>
+          <a:chOff x="0" y="0"/>
+          <a:chExt cx="0" cy="0"/>
+        </a:xfrm>
+      </p:grpSpPr>
+      <p:sp>
+        <p:nvSpPr>
+          <p:cNvPr id="2" name="Title 1"/>
+          <p:cNvSpPr>
+            <a:spLocks noGrp="1"/>
+          </p:cNvSpPr>
+          <p:nvPr>
+            <p:ph type="title"/>
+          </p:nvPr>
+        </p:nvSpPr>
+        <p:spPr/>
+        <p:txBody>
+          <a:bodyPr/>
+          <a:lstStyle/>
+          <a:p>
+            <a:r>
+              <a:rPr lang="en-US" dirty="0" smtClean="0"/>
+              <a:t>Python 2</a:t>
+            </a:r>
+            <a:endParaRPr lang="en-US" dirty="0"/>
+          </a:p>
+        </p:txBody>
+      </p:sp>
+      <p:sp>
+        <p:nvSpPr>
+          <p:cNvPr id="3" name="Content Placeholder 2"/>
+          <p:cNvSpPr>
+            <a:spLocks noGrp="1"/>
+          </p:cNvSpPr>
+          <p:nvPr>
+            <p:ph idx="1"/>
+          </p:nvPr>
+        </p:nvSpPr>
+        <p:spPr>
+          <a:xfrm>
+            <a:off x="457200" y="1600200"/>
+            <a:ext cx="8534400" cy="5105400"/>
+          </a:xfrm>
+        </p:spPr>
+        <p:txBody>
+          <a:bodyPr>
+            <a:normAutofit/>
+          </a:bodyPr>
+          <a:lstStyle/>
+          <a:p>
+            <a:r>
+              <a:rPr lang="en-US" dirty="0" smtClean="0"/>
+              <a:t>6 sessions</a:t>
+            </a:r>
+          </a:p>
+          <a:p>
+            <a:pPr lvl="1"/>
+            <a:r>
+              <a:rPr lang="en-US" dirty="0" smtClean="0"/>
+              <a:t>Tuesday and Thursdays starting January 27, 2015</a:t>
+            </a:r>
+          </a:p>
+          <a:p>
+            <a:r>
+              <a:rPr lang="en-US" dirty="0" smtClean="0"/>
+              <a:t>Will cover</a:t>
+            </a:r>
+          </a:p>
+          <a:p>
+            <a:pPr lvl="1"/>
+            <a:r>
+              <a:rPr lang="en-US" dirty="0" smtClean="0"/>
+              <a:t>More on functions</a:t>
+            </a:r>
+          </a:p>
+          <a:p>
+            <a:pPr lvl="1"/>
+            <a:r>
+              <a:rPr lang="en-US" dirty="0" smtClean="0"/>
+              <a:t>Classes</a:t>
+            </a:r>
+          </a:p>
+          <a:p>
+            <a:pPr lvl="1"/>
+            <a:r>
+              <a:rPr lang="en-US" dirty="0" smtClean="0"/>
+              <a:t>Debugging and testing</a:t>
+            </a:r>
+          </a:p>
+          <a:p>
+            <a:pPr lvl="1"/>
+            <a:r>
+              <a:rPr lang="en-US" dirty="0" smtClean="0"/>
+              <a:t>More advanced data structures</a:t>
+            </a:r>
+          </a:p>
+          <a:p>
+            <a:pPr lvl="1"/>
+            <a:r>
+              <a:rPr lang="en-US" dirty="0" smtClean="0"/>
+              <a:t>Reading/writing JSON and simple SQL databases</a:t>
+            </a:r>
+          </a:p>
+          <a:p>
+            <a:pPr lvl="1"/>
+            <a:r>
+              <a:rPr lang="en-US" dirty="0" smtClean="0"/>
+              <a:t>Matrices</a:t>
+            </a:r>
+          </a:p>
+          <a:p>
+            <a:pPr lvl="1"/>
+            <a:endParaRPr lang="en-US" dirty="0"/>
+          </a:p>
+        </p:txBody>
+      </p:sp>
+    </p:spTree>
+    <p:extLst>
+      <p:ext uri="{BB962C8B-B14F-4D97-AF65-F5344CB8AC3E}">
+        <p14:creationId xmlns:p14="http://schemas.microsoft.com/office/powerpoint/2010/main" val="2888273813"/>
+      </p:ext>
+    </p:extLst>
+  </p:cSld>
+  <p:clrMapOvr>
+    <a:masterClrMapping/>
+  </p:clrMapOvr>
+  <p:timing>
+    <p:tnLst>
+      <p:par>
+        <p:cTn xmlns:p14="http://schemas.microsoft.com/office/powerpoint/2010/main" id="1" dur="indefinite" restart="never" nodeType="tmRoot"/>
+      </p:par>
+    </p:tnLst>
+  </p:timing>
+</p:sld>
+</file>
+
+<file path=ppt/slides/slide58.xml><?xml version="1.0" encoding="utf-8"?>
+<p:sld xmlns:a="http://schemas.openxmlformats.org/drawingml/2006/main" xmlns:r="http://schemas.openxmlformats.org/officeDocument/2006/relationships" xmlns:p="http://schemas.openxmlformats.org/presentationml/2006/main">
+  <p:cSld>
+    <p:spTree>
+      <p:nvGrpSpPr>
+        <p:cNvPr id="1" name=""/>
+        <p:cNvGrpSpPr/>
+        <p:nvPr/>
+      </p:nvGrpSpPr>
+      <p:grpSpPr>
+        <a:xfrm>
+          <a:off x="0" y="0"/>
+          <a:ext cx="0" cy="0"/>
+          <a:chOff x="0" y="0"/>
+          <a:chExt cx="0" cy="0"/>
+        </a:xfrm>
+      </p:grpSpPr>
+      <p:sp>
+        <p:nvSpPr>
+          <p:cNvPr id="2" name="Title 1"/>
+          <p:cNvSpPr>
+            <a:spLocks noGrp="1"/>
+          </p:cNvSpPr>
+          <p:nvPr>
+            <p:ph type="title"/>
+          </p:nvPr>
+        </p:nvSpPr>
+        <p:spPr/>
+        <p:txBody>
+          <a:bodyPr/>
+          <a:lstStyle/>
+          <a:p>
+            <a:r>
+              <a:rPr lang="en-US" dirty="0" smtClean="0"/>
+              <a:t>Resources</a:t>
+            </a:r>
+            <a:endParaRPr lang="en-US" dirty="0"/>
+          </a:p>
+        </p:txBody>
+      </p:sp>
+      <p:sp>
+        <p:nvSpPr>
+          <p:cNvPr id="3" name="Content Placeholder 2"/>
+          <p:cNvSpPr>
+            <a:spLocks noGrp="1"/>
+          </p:cNvSpPr>
+          <p:nvPr>
+            <p:ph idx="1"/>
+          </p:nvPr>
+        </p:nvSpPr>
+        <p:spPr/>
+        <p:txBody>
+          <a:bodyPr>
+            <a:normAutofit fontScale="92500" lnSpcReduction="20000"/>
+          </a:bodyPr>
+          <a:lstStyle/>
+          <a:p>
+            <a:r>
+              <a:rPr lang="en-US" dirty="0" smtClean="0"/>
+              <a:t>Python cheat sheet</a:t>
+            </a:r>
+          </a:p>
+          <a:p>
+            <a:pPr lvl="1"/>
+            <a:r>
+              <a:rPr lang="en-US" dirty="0">
+                <a:hlinkClick r:id="rId2"/>
+              </a:rPr>
+              <a:t>https://www.addedbytes.com/cheat-sheets/python-cheat-sheet</a:t>
+            </a:r>
+            <a:r>
+              <a:rPr lang="en-US" dirty="0" smtClean="0">
+                <a:hlinkClick r:id="rId2"/>
+              </a:rPr>
+              <a:t>/</a:t>
+            </a:r>
+            <a:endParaRPr lang="en-US" dirty="0" smtClean="0"/>
+          </a:p>
+          <a:p>
+            <a:r>
+              <a:rPr lang="en-US" dirty="0" smtClean="0"/>
+              <a:t>pip repository</a:t>
+            </a:r>
+          </a:p>
+          <a:p>
+            <a:pPr lvl="1"/>
+            <a:r>
+              <a:rPr lang="en-US" dirty="0">
+                <a:hlinkClick r:id="rId3"/>
+              </a:rPr>
+              <a:t>https://pypi.python.org/pypi/pip</a:t>
+            </a:r>
+            <a:r>
+              <a:rPr lang="en-US" dirty="0" smtClean="0">
+                <a:hlinkClick r:id="rId3"/>
+              </a:rPr>
+              <a:t>/</a:t>
+            </a:r>
+            <a:endParaRPr lang="en-US" dirty="0" smtClean="0"/>
+          </a:p>
+          <a:p>
+            <a:r>
+              <a:rPr lang="en-US" dirty="0" smtClean="0"/>
+              <a:t>Scientific computing</a:t>
+            </a:r>
+          </a:p>
+          <a:p>
+            <a:pPr lvl="1"/>
+            <a:r>
+              <a:rPr lang="en-US" dirty="0">
+                <a:hlinkClick r:id="rId4"/>
+              </a:rPr>
+              <a:t>http://pandas.pydata.org</a:t>
+            </a:r>
+            <a:r>
+              <a:rPr lang="en-US" dirty="0" smtClean="0">
+                <a:hlinkClick r:id="rId4"/>
+              </a:rPr>
+              <a:t>/</a:t>
+            </a:r>
+            <a:endParaRPr lang="en-US" dirty="0" smtClean="0"/>
+          </a:p>
+          <a:p>
+            <a:pPr lvl="1"/>
+            <a:r>
+              <a:rPr lang="en-US" dirty="0">
+                <a:hlinkClick r:id="rId5"/>
+              </a:rPr>
+              <a:t>http://matplotlib.org</a:t>
+            </a:r>
+            <a:r>
+              <a:rPr lang="en-US" dirty="0" smtClean="0">
+                <a:hlinkClick r:id="rId5"/>
+              </a:rPr>
+              <a:t>/</a:t>
+            </a:r>
+            <a:endParaRPr lang="en-US" dirty="0" smtClean="0"/>
+          </a:p>
+          <a:p>
+            <a:pPr lvl="1"/>
+            <a:r>
+              <a:rPr lang="en-US" dirty="0">
+                <a:hlinkClick r:id="rId6"/>
+              </a:rPr>
+              <a:t>http://www.scipy.org</a:t>
+            </a:r>
+            <a:r>
+              <a:rPr lang="en-US" dirty="0" smtClean="0">
+                <a:hlinkClick r:id="rId6"/>
+              </a:rPr>
+              <a:t>/</a:t>
+            </a:r>
+            <a:endParaRPr lang="en-US" dirty="0" smtClean="0"/>
+          </a:p>
+          <a:p>
+            <a:r>
+              <a:rPr lang="en-US" dirty="0" smtClean="0"/>
+              <a:t>Online reading</a:t>
+            </a:r>
+            <a:endParaRPr lang="en-US" dirty="0"/>
+          </a:p>
+          <a:p>
+            <a:pPr lvl="1"/>
+            <a:r>
+              <a:rPr lang="en-US" dirty="0">
+                <a:hlinkClick r:id="rId7"/>
+              </a:rPr>
+              <a:t>http://inventwithpython.com/bookshelf</a:t>
+            </a:r>
+            <a:r>
+              <a:rPr lang="en-US" dirty="0" smtClean="0">
+                <a:hlinkClick r:id="rId7"/>
+              </a:rPr>
+              <a:t>/</a:t>
+            </a:r>
+            <a:endParaRPr lang="en-US" dirty="0"/>
+          </a:p>
+          <a:p>
+            <a:pPr lvl="1"/>
+            <a:endParaRPr lang="en-US" dirty="0"/>
+          </a:p>
+          <a:p>
+            <a:pPr lvl="1"/>
+            <a:endParaRPr lang="en-US" dirty="0"/>
+          </a:p>
+        </p:txBody>
+      </p:sp>
+    </p:spTree>
+    <p:extLst>
+      <p:ext uri="{BB962C8B-B14F-4D97-AF65-F5344CB8AC3E}">
+        <p14:creationId xmlns:p14="http://schemas.microsoft.com/office/powerpoint/2010/main" val="2477658261"/>
+      </p:ext>
+    </p:extLst>
+  </p:cSld>
+  <p:clrMapOvr>
+    <a:masterClrMapping/>
+  </p:clrMapOvr>
+  <p:timing>
+    <p:tnLst>
+      <p:par>
+        <p:cTn xmlns:p14="http://schemas.microsoft.com/office/powerpoint/2010/main" id="1" dur="indefinite" restart="never" nodeType="tmRoot"/>
+      </p:par>
+    </p:tnLst>
+  </p:timing>
+</p:sld>
+</file>
+
+<file path=ppt/slides/slide59.xml><?xml version="1.0" encoding="utf-8"?>
+<p:sld xmlns:a="http://schemas.openxmlformats.org/drawingml/2006/main" xmlns:r="http://schemas.openxmlformats.org/officeDocument/2006/relationships" xmlns:p="http://schemas.openxmlformats.org/presentationml/2006/main">
+  <p:cSld>
+    <p:spTree>
+      <p:nvGrpSpPr>
+        <p:cNvPr id="1" name=""/>
+        <p:cNvGrpSpPr/>
+        <p:nvPr/>
+      </p:nvGrpSpPr>
+      <p:grpSpPr>
+        <a:xfrm>
+          <a:off x="0" y="0"/>
+          <a:ext cx="0" cy="0"/>
+          <a:chOff x="0" y="0"/>
+          <a:chExt cx="0" cy="0"/>
+        </a:xfrm>
+      </p:grpSpPr>
+      <p:sp>
+        <p:nvSpPr>
+          <p:cNvPr id="2" name="Title 1"/>
+          <p:cNvSpPr>
+            <a:spLocks noGrp="1"/>
+          </p:cNvSpPr>
+          <p:nvPr>
+            <p:ph type="title"/>
+          </p:nvPr>
+        </p:nvSpPr>
+        <p:spPr/>
+        <p:txBody>
+          <a:bodyPr/>
+          <a:lstStyle/>
+          <a:p>
+            <a:r>
+              <a:rPr lang="en-US" dirty="0" smtClean="0"/>
+              <a:t>IDE</a:t>
+            </a:r>
+            <a:endParaRPr lang="en-US" dirty="0"/>
+          </a:p>
+        </p:txBody>
+      </p:sp>
+      <p:sp>
+        <p:nvSpPr>
+          <p:cNvPr id="3" name="Content Placeholder 2"/>
+          <p:cNvSpPr>
+            <a:spLocks noGrp="1"/>
+          </p:cNvSpPr>
+          <p:nvPr>
+            <p:ph idx="1"/>
+          </p:nvPr>
+        </p:nvSpPr>
+        <p:spPr/>
+        <p:txBody>
+          <a:bodyPr/>
+          <a:lstStyle/>
+          <a:p>
+            <a:r>
+              <a:rPr lang="en-US" dirty="0" err="1" smtClean="0"/>
+              <a:t>Spyder</a:t>
+            </a:r>
+            <a:endParaRPr lang="en-US" dirty="0" smtClean="0"/>
+          </a:p>
+          <a:p>
+            <a:r>
+              <a:rPr lang="en-US" dirty="0" err="1" smtClean="0"/>
+              <a:t>iPython</a:t>
+            </a:r>
+            <a:r>
+              <a:rPr lang="en-US" dirty="0" smtClean="0"/>
+              <a:t> notebooks</a:t>
+            </a:r>
+          </a:p>
+          <a:p>
+            <a:r>
+              <a:rPr lang="en-US" dirty="0" err="1" smtClean="0"/>
+              <a:t>pyCharm</a:t>
+            </a:r>
+            <a:endParaRPr lang="en-US" dirty="0" smtClean="0"/>
+          </a:p>
+          <a:p>
+            <a:r>
+              <a:rPr lang="en-US" dirty="0" smtClean="0"/>
+              <a:t>Eclipse</a:t>
+            </a:r>
+          </a:p>
+          <a:p>
+            <a:pPr marL="0" indent="0">
+              <a:buNone/>
+            </a:pPr>
+            <a:endParaRPr lang="en-US" dirty="0"/>
+          </a:p>
+        </p:txBody>
+      </p:sp>
+    </p:spTree>
+    <p:extLst>
+      <p:ext uri="{BB962C8B-B14F-4D97-AF65-F5344CB8AC3E}">
+        <p14:creationId xmlns:p14="http://schemas.microsoft.com/office/powerpoint/2010/main" val="796052046"/>
+      </p:ext>
+    </p:extLst>
+  </p:cSld>
+  <p:clrMapOvr>
+    <a:masterClrMapping/>
+  </p:clrMapOvr>
+  <p:timing>
+    <p:tnLst>
+      <p:par>
+        <p:cTn xmlns:p14="http://schemas.microsoft.com/office/powerpoint/2010/main" id="1" dur="indefinite" restart="never" nodeType="tmRoot"/>
+      </p:par>
+    </p:tnLst>
+  </p:timing>
 </p:sld>
 </file>
 
@@ -12019,6 +12585,299 @@
       </p:par>
     </p:tnLst>
   </p:timing>
+</p:sld>
+</file>
+
+<file path=ppt/slides/slide60.xml><?xml version="1.0" encoding="utf-8"?>
+<p:sld xmlns:a="http://schemas.openxmlformats.org/drawingml/2006/main" xmlns:r="http://schemas.openxmlformats.org/officeDocument/2006/relationships" xmlns:p="http://schemas.openxmlformats.org/presentationml/2006/main">
+  <p:cSld>
+    <p:spTree>
+      <p:nvGrpSpPr>
+        <p:cNvPr id="1" name=""/>
+        <p:cNvGrpSpPr/>
+        <p:nvPr/>
+      </p:nvGrpSpPr>
+      <p:grpSpPr>
+        <a:xfrm>
+          <a:off x="0" y="0"/>
+          <a:ext cx="0" cy="0"/>
+          <a:chOff x="0" y="0"/>
+          <a:chExt cx="0" cy="0"/>
+        </a:xfrm>
+      </p:grpSpPr>
+      <p:sp>
+        <p:nvSpPr>
+          <p:cNvPr id="2" name="Title 1"/>
+          <p:cNvSpPr>
+            <a:spLocks noGrp="1"/>
+          </p:cNvSpPr>
+          <p:nvPr>
+            <p:ph type="title"/>
+          </p:nvPr>
+        </p:nvSpPr>
+        <p:spPr/>
+        <p:txBody>
+          <a:bodyPr/>
+          <a:lstStyle/>
+          <a:p>
+            <a:r>
+              <a:rPr lang="en-US" dirty="0" err="1" smtClean="0"/>
+              <a:t>pysam</a:t>
+            </a:r>
+            <a:endParaRPr lang="en-US" dirty="0"/>
+          </a:p>
+        </p:txBody>
+      </p:sp>
+      <p:pic>
+        <p:nvPicPr>
+          <p:cNvPr id="4" name="Picture 3" descr="Screen shot 2014-12-16 at 6.36.35 PM.png"/>
+          <p:cNvPicPr>
+            <a:picLocks noChangeAspect="1"/>
+          </p:cNvPicPr>
+          <p:nvPr/>
+        </p:nvPicPr>
+        <p:blipFill>
+          <a:blip r:embed="rId2">
+            <a:extLst>
+              <a:ext uri="{28A0092B-C50C-407E-A947-70E740481C1C}">
+                <a14:useLocalDpi xmlns:a14="http://schemas.microsoft.com/office/drawing/2010/main" val="0"/>
+              </a:ext>
+            </a:extLst>
+          </a:blip>
+          <a:stretch>
+            <a:fillRect/>
+          </a:stretch>
+        </p:blipFill>
+        <p:spPr>
+          <a:xfrm>
+            <a:off x="696391" y="1417638"/>
+            <a:ext cx="7736417" cy="4857942"/>
+          </a:xfrm>
+          <a:prstGeom prst="rect">
+            <a:avLst/>
+          </a:prstGeom>
+        </p:spPr>
+      </p:pic>
+    </p:spTree>
+    <p:extLst>
+      <p:ext uri="{BB962C8B-B14F-4D97-AF65-F5344CB8AC3E}">
+        <p14:creationId xmlns:p14="http://schemas.microsoft.com/office/powerpoint/2010/main" val="2324822215"/>
+      </p:ext>
+    </p:extLst>
+  </p:cSld>
+  <p:clrMapOvr>
+    <a:masterClrMapping/>
+  </p:clrMapOvr>
+  <p:timing>
+    <p:tnLst>
+      <p:par>
+        <p:cTn xmlns:p14="http://schemas.microsoft.com/office/powerpoint/2010/main" id="1" dur="indefinite" restart="never" nodeType="tmRoot"/>
+      </p:par>
+    </p:tnLst>
+  </p:timing>
+</p:sld>
+</file>
+
+<file path=ppt/slides/slide61.xml><?xml version="1.0" encoding="utf-8"?>
+<p:sld xmlns:a="http://schemas.openxmlformats.org/drawingml/2006/main" xmlns:r="http://schemas.openxmlformats.org/officeDocument/2006/relationships" xmlns:p="http://schemas.openxmlformats.org/presentationml/2006/main">
+  <p:cSld>
+    <p:spTree>
+      <p:nvGrpSpPr>
+        <p:cNvPr id="1" name=""/>
+        <p:cNvGrpSpPr/>
+        <p:nvPr/>
+      </p:nvGrpSpPr>
+      <p:grpSpPr>
+        <a:xfrm>
+          <a:off x="0" y="0"/>
+          <a:ext cx="0" cy="0"/>
+          <a:chOff x="0" y="0"/>
+          <a:chExt cx="0" cy="0"/>
+        </a:xfrm>
+      </p:grpSpPr>
+      <p:sp>
+        <p:nvSpPr>
+          <p:cNvPr id="2" name="Title 1"/>
+          <p:cNvSpPr>
+            <a:spLocks noGrp="1"/>
+          </p:cNvSpPr>
+          <p:nvPr>
+            <p:ph type="title"/>
+          </p:nvPr>
+        </p:nvSpPr>
+        <p:spPr/>
+        <p:txBody>
+          <a:bodyPr/>
+          <a:lstStyle/>
+          <a:p>
+            <a:endParaRPr lang="en-US"/>
+          </a:p>
+        </p:txBody>
+      </p:sp>
+    </p:spTree>
+    <p:extLst>
+      <p:ext uri="{BB962C8B-B14F-4D97-AF65-F5344CB8AC3E}">
+        <p14:creationId xmlns:p14="http://schemas.microsoft.com/office/powerpoint/2010/main" val="80243271"/>
+      </p:ext>
+    </p:extLst>
+  </p:cSld>
+  <p:clrMapOvr>
+    <a:masterClrMapping/>
+  </p:clrMapOvr>
+  <p:timing>
+    <p:tnLst>
+      <p:par>
+        <p:cTn xmlns:p14="http://schemas.microsoft.com/office/powerpoint/2010/main" id="1" dur="indefinite" restart="never" nodeType="tmRoot"/>
+      </p:par>
+    </p:tnLst>
+  </p:timing>
+</p:sld>
+</file>
+
+<file path=ppt/slides/slide62.xml><?xml version="1.0" encoding="utf-8"?>
+<p:sld xmlns:a="http://schemas.openxmlformats.org/drawingml/2006/main" xmlns:r="http://schemas.openxmlformats.org/officeDocument/2006/relationships" xmlns:p="http://schemas.openxmlformats.org/presentationml/2006/main">
+  <p:cSld>
+    <p:spTree>
+      <p:nvGrpSpPr>
+        <p:cNvPr id="1" name=""/>
+        <p:cNvGrpSpPr/>
+        <p:nvPr/>
+      </p:nvGrpSpPr>
+      <p:grpSpPr>
+        <a:xfrm>
+          <a:off x="0" y="0"/>
+          <a:ext cx="0" cy="0"/>
+          <a:chOff x="0" y="0"/>
+          <a:chExt cx="0" cy="0"/>
+        </a:xfrm>
+      </p:grpSpPr>
+      <p:sp>
+        <p:nvSpPr>
+          <p:cNvPr id="2" name="Title 1"/>
+          <p:cNvSpPr>
+            <a:spLocks noGrp="1"/>
+          </p:cNvSpPr>
+          <p:nvPr>
+            <p:ph type="title"/>
+          </p:nvPr>
+        </p:nvSpPr>
+        <p:spPr/>
+        <p:txBody>
+          <a:bodyPr/>
+          <a:lstStyle/>
+          <a:p>
+            <a:endParaRPr lang="en-US"/>
+          </a:p>
+        </p:txBody>
+      </p:sp>
+    </p:spTree>
+    <p:extLst>
+      <p:ext uri="{BB962C8B-B14F-4D97-AF65-F5344CB8AC3E}">
+        <p14:creationId xmlns:p14="http://schemas.microsoft.com/office/powerpoint/2010/main" val="3988296144"/>
+      </p:ext>
+    </p:extLst>
+  </p:cSld>
+  <p:clrMapOvr>
+    <a:masterClrMapping/>
+  </p:clrMapOvr>
+</p:sld>
+</file>
+
+<file path=ppt/slides/slide63.xml><?xml version="1.0" encoding="utf-8"?>
+<p:sld xmlns:a="http://schemas.openxmlformats.org/drawingml/2006/main" xmlns:r="http://schemas.openxmlformats.org/officeDocument/2006/relationships" xmlns:p="http://schemas.openxmlformats.org/presentationml/2006/main">
+  <p:cSld>
+    <p:spTree>
+      <p:nvGrpSpPr>
+        <p:cNvPr id="1" name=""/>
+        <p:cNvGrpSpPr/>
+        <p:nvPr/>
+      </p:nvGrpSpPr>
+      <p:grpSpPr>
+        <a:xfrm>
+          <a:off x="0" y="0"/>
+          <a:ext cx="0" cy="0"/>
+          <a:chOff x="0" y="0"/>
+          <a:chExt cx="0" cy="0"/>
+        </a:xfrm>
+      </p:grpSpPr>
+      <p:sp>
+        <p:nvSpPr>
+          <p:cNvPr id="2" name="Title 1"/>
+          <p:cNvSpPr>
+            <a:spLocks noGrp="1"/>
+          </p:cNvSpPr>
+          <p:nvPr>
+            <p:ph type="title"/>
+          </p:nvPr>
+        </p:nvSpPr>
+        <p:spPr/>
+        <p:txBody>
+          <a:bodyPr/>
+          <a:lstStyle/>
+          <a:p>
+            <a:endParaRPr lang="en-US"/>
+          </a:p>
+        </p:txBody>
+      </p:sp>
+    </p:spTree>
+    <p:extLst>
+      <p:ext uri="{BB962C8B-B14F-4D97-AF65-F5344CB8AC3E}">
+        <p14:creationId xmlns:p14="http://schemas.microsoft.com/office/powerpoint/2010/main" val="776374453"/>
+      </p:ext>
+    </p:extLst>
+  </p:cSld>
+  <p:clrMapOvr>
+    <a:masterClrMapping/>
+  </p:clrMapOvr>
+</p:sld>
+</file>
+
+<file path=ppt/slides/slide64.xml><?xml version="1.0" encoding="utf-8"?>
+<p:sld xmlns:a="http://schemas.openxmlformats.org/drawingml/2006/main" xmlns:r="http://schemas.openxmlformats.org/officeDocument/2006/relationships" xmlns:p="http://schemas.openxmlformats.org/presentationml/2006/main">
+  <p:cSld>
+    <p:spTree>
+      <p:nvGrpSpPr>
+        <p:cNvPr id="1" name=""/>
+        <p:cNvGrpSpPr/>
+        <p:nvPr/>
+      </p:nvGrpSpPr>
+      <p:grpSpPr>
+        <a:xfrm>
+          <a:off x="0" y="0"/>
+          <a:ext cx="0" cy="0"/>
+          <a:chOff x="0" y="0"/>
+          <a:chExt cx="0" cy="0"/>
+        </a:xfrm>
+      </p:grpSpPr>
+      <p:sp>
+        <p:nvSpPr>
+          <p:cNvPr id="2" name="Title 1"/>
+          <p:cNvSpPr>
+            <a:spLocks noGrp="1"/>
+          </p:cNvSpPr>
+          <p:nvPr>
+            <p:ph type="title"/>
+          </p:nvPr>
+        </p:nvSpPr>
+        <p:spPr/>
+        <p:txBody>
+          <a:bodyPr/>
+          <a:lstStyle/>
+          <a:p>
+            <a:endParaRPr lang="en-US"/>
+          </a:p>
+        </p:txBody>
+      </p:sp>
+    </p:spTree>
+    <p:extLst>
+      <p:ext uri="{BB962C8B-B14F-4D97-AF65-F5344CB8AC3E}">
+        <p14:creationId xmlns:p14="http://schemas.microsoft.com/office/powerpoint/2010/main" val="2655132459"/>
+      </p:ext>
+    </p:extLst>
+  </p:cSld>
+  <p:clrMapOvr>
+    <a:masterClrMapping/>
+  </p:clrMapOvr>
 </p:sld>
 </file>
 

</xml_diff>